<commit_message>
Updated Weekly & Monthly
</commit_message>
<xml_diff>
--- a/Assignments/Semester2/E04-Sage_Presentation.pptx
+++ b/Assignments/Semester2/E04-Sage_Presentation.pptx
@@ -5,24 +5,25 @@
     <p:sldMasterId id="2147483696" r:id="rId1"/>
   </p:sldMasterIdLst>
   <p:notesMasterIdLst>
-    <p:notesMasterId r:id="rId17"/>
+    <p:notesMasterId r:id="rId18"/>
   </p:notesMasterIdLst>
   <p:sldIdLst>
-    <p:sldId id="256" r:id="rId2"/>
-    <p:sldId id="257" r:id="rId3"/>
-    <p:sldId id="258" r:id="rId4"/>
-    <p:sldId id="270" r:id="rId5"/>
-    <p:sldId id="259" r:id="rId6"/>
-    <p:sldId id="280" r:id="rId7"/>
-    <p:sldId id="272" r:id="rId8"/>
-    <p:sldId id="273" r:id="rId9"/>
-    <p:sldId id="274" r:id="rId10"/>
-    <p:sldId id="275" r:id="rId11"/>
-    <p:sldId id="276" r:id="rId12"/>
-    <p:sldId id="277" r:id="rId13"/>
-    <p:sldId id="278" r:id="rId14"/>
-    <p:sldId id="261" r:id="rId15"/>
-    <p:sldId id="281" r:id="rId16"/>
+    <p:sldId id="282" r:id="rId2"/>
+    <p:sldId id="256" r:id="rId3"/>
+    <p:sldId id="257" r:id="rId4"/>
+    <p:sldId id="258" r:id="rId5"/>
+    <p:sldId id="270" r:id="rId6"/>
+    <p:sldId id="259" r:id="rId7"/>
+    <p:sldId id="280" r:id="rId8"/>
+    <p:sldId id="272" r:id="rId9"/>
+    <p:sldId id="273" r:id="rId10"/>
+    <p:sldId id="274" r:id="rId11"/>
+    <p:sldId id="275" r:id="rId12"/>
+    <p:sldId id="276" r:id="rId13"/>
+    <p:sldId id="277" r:id="rId14"/>
+    <p:sldId id="278" r:id="rId15"/>
+    <p:sldId id="261" r:id="rId16"/>
+    <p:sldId id="281" r:id="rId17"/>
   </p:sldIdLst>
   <p:sldSz cx="12192000" cy="6858000"/>
   <p:notesSz cx="6858000" cy="9144000"/>
@@ -24176,7 +24177,7 @@
           <a:p>
             <a:fld id="{6809CA1E-AFB4-4D78-A221-6C5973EE8213}" type="datetimeFigureOut">
               <a:rPr lang="en-US" smtClean="0"/>
-              <a:t>4/2/2020</a:t>
+              <a:t>4/3/2020</a:t>
             </a:fld>
             <a:endParaRPr lang="en-US"/>
           </a:p>
@@ -24508,7 +24509,7 @@
           <a:p>
             <a:fld id="{A9E3DE0A-B087-4BC0-BFD2-5E15C6605E7B}" type="slidenum">
               <a:rPr lang="en-US" smtClean="0"/>
-              <a:t>13</a:t>
+              <a:t>14</a:t>
             </a:fld>
             <a:endParaRPr lang="en-US"/>
           </a:p>
@@ -24740,7 +24741,7 @@
           <a:p>
             <a:fld id="{D5CC1E73-71FD-4C17-BF7E-AE74FB2EE1A1}" type="datetimeFigureOut">
               <a:rPr lang="en-US" smtClean="0"/>
-              <a:t>4/2/2020</a:t>
+              <a:t>4/3/2020</a:t>
             </a:fld>
             <a:endParaRPr lang="en-US"/>
           </a:p>
@@ -25031,7 +25032,7 @@
           <a:p>
             <a:fld id="{D5CC1E73-71FD-4C17-BF7E-AE74FB2EE1A1}" type="datetimeFigureOut">
               <a:rPr lang="en-US" smtClean="0"/>
-              <a:t>4/2/2020</a:t>
+              <a:t>4/3/2020</a:t>
             </a:fld>
             <a:endParaRPr lang="en-US"/>
           </a:p>
@@ -25290,7 +25291,7 @@
           <a:p>
             <a:fld id="{D5CC1E73-71FD-4C17-BF7E-AE74FB2EE1A1}" type="datetimeFigureOut">
               <a:rPr lang="en-US" smtClean="0"/>
-              <a:t>4/2/2020</a:t>
+              <a:t>4/3/2020</a:t>
             </a:fld>
             <a:endParaRPr lang="en-US"/>
           </a:p>
@@ -25759,7 +25760,7 @@
           <a:p>
             <a:fld id="{D5CC1E73-71FD-4C17-BF7E-AE74FB2EE1A1}" type="datetimeFigureOut">
               <a:rPr lang="en-US" smtClean="0"/>
-              <a:t>4/2/2020</a:t>
+              <a:t>4/3/2020</a:t>
             </a:fld>
             <a:endParaRPr lang="en-US"/>
           </a:p>
@@ -25939,7 +25940,7 @@
           <a:p>
             <a:fld id="{D5CC1E73-71FD-4C17-BF7E-AE74FB2EE1A1}" type="datetimeFigureOut">
               <a:rPr lang="en-US" smtClean="0"/>
-              <a:t>4/2/2020</a:t>
+              <a:t>4/3/2020</a:t>
             </a:fld>
             <a:endParaRPr lang="en-US"/>
           </a:p>
@@ -26515,7 +26516,7 @@
           <a:p>
             <a:fld id="{D5CC1E73-71FD-4C17-BF7E-AE74FB2EE1A1}" type="datetimeFigureOut">
               <a:rPr lang="en-US" smtClean="0"/>
-              <a:t>4/2/2020</a:t>
+              <a:t>4/3/2020</a:t>
             </a:fld>
             <a:endParaRPr lang="en-US"/>
           </a:p>
@@ -26847,7 +26848,7 @@
           <a:p>
             <a:fld id="{D5CC1E73-71FD-4C17-BF7E-AE74FB2EE1A1}" type="datetimeFigureOut">
               <a:rPr lang="en-US" smtClean="0"/>
-              <a:t>4/2/2020</a:t>
+              <a:t>4/3/2020</a:t>
             </a:fld>
             <a:endParaRPr lang="en-US"/>
           </a:p>
@@ -27022,7 +27023,7 @@
           <a:p>
             <a:fld id="{D5CC1E73-71FD-4C17-BF7E-AE74FB2EE1A1}" type="datetimeFigureOut">
               <a:rPr lang="en-US" smtClean="0"/>
-              <a:t>4/2/2020</a:t>
+              <a:t>4/3/2020</a:t>
             </a:fld>
             <a:endParaRPr lang="en-US"/>
           </a:p>
@@ -27202,7 +27203,7 @@
           <a:p>
             <a:fld id="{D5CC1E73-71FD-4C17-BF7E-AE74FB2EE1A1}" type="datetimeFigureOut">
               <a:rPr lang="en-US" smtClean="0"/>
-              <a:t>4/2/2020</a:t>
+              <a:t>4/3/2020</a:t>
             </a:fld>
             <a:endParaRPr lang="en-US"/>
           </a:p>
@@ -27372,7 +27373,7 @@
           <a:p>
             <a:fld id="{D5CC1E73-71FD-4C17-BF7E-AE74FB2EE1A1}" type="datetimeFigureOut">
               <a:rPr lang="en-US" smtClean="0"/>
-              <a:t>4/2/2020</a:t>
+              <a:t>4/3/2020</a:t>
             </a:fld>
             <a:endParaRPr lang="en-US"/>
           </a:p>
@@ -27629,7 +27630,7 @@
           <a:p>
             <a:fld id="{D5CC1E73-71FD-4C17-BF7E-AE74FB2EE1A1}" type="datetimeFigureOut">
               <a:rPr lang="en-US" smtClean="0"/>
-              <a:t>4/2/2020</a:t>
+              <a:t>4/3/2020</a:t>
             </a:fld>
             <a:endParaRPr lang="en-US"/>
           </a:p>
@@ -27921,7 +27922,7 @@
           <a:p>
             <a:fld id="{D5CC1E73-71FD-4C17-BF7E-AE74FB2EE1A1}" type="datetimeFigureOut">
               <a:rPr lang="en-US" smtClean="0"/>
-              <a:t>4/2/2020</a:t>
+              <a:t>4/3/2020</a:t>
             </a:fld>
             <a:endParaRPr lang="en-US"/>
           </a:p>
@@ -28351,7 +28352,7 @@
           <a:p>
             <a:fld id="{D5CC1E73-71FD-4C17-BF7E-AE74FB2EE1A1}" type="datetimeFigureOut">
               <a:rPr lang="en-US" smtClean="0"/>
-              <a:t>4/2/2020</a:t>
+              <a:t>4/3/2020</a:t>
             </a:fld>
             <a:endParaRPr lang="en-US"/>
           </a:p>
@@ -28469,7 +28470,7 @@
           <a:p>
             <a:fld id="{D5CC1E73-71FD-4C17-BF7E-AE74FB2EE1A1}" type="datetimeFigureOut">
               <a:rPr lang="en-US" smtClean="0"/>
-              <a:t>4/2/2020</a:t>
+              <a:t>4/3/2020</a:t>
             </a:fld>
             <a:endParaRPr lang="en-US"/>
           </a:p>
@@ -28564,7 +28565,7 @@
           <a:p>
             <a:fld id="{D5CC1E73-71FD-4C17-BF7E-AE74FB2EE1A1}" type="datetimeFigureOut">
               <a:rPr lang="en-US" smtClean="0"/>
-              <a:t>4/2/2020</a:t>
+              <a:t>4/3/2020</a:t>
             </a:fld>
             <a:endParaRPr lang="en-US"/>
           </a:p>
@@ -28847,7 +28848,7 @@
           <a:p>
             <a:fld id="{D5CC1E73-71FD-4C17-BF7E-AE74FB2EE1A1}" type="datetimeFigureOut">
               <a:rPr lang="en-US" smtClean="0"/>
-              <a:t>4/2/2020</a:t>
+              <a:t>4/3/2020</a:t>
             </a:fld>
             <a:endParaRPr lang="en-US"/>
           </a:p>
@@ -29138,7 +29139,7 @@
           <a:p>
             <a:fld id="{D5CC1E73-71FD-4C17-BF7E-AE74FB2EE1A1}" type="datetimeFigureOut">
               <a:rPr lang="en-US" smtClean="0"/>
-              <a:t>4/2/2020</a:t>
+              <a:t>4/3/2020</a:t>
             </a:fld>
             <a:endParaRPr lang="en-US"/>
           </a:p>
@@ -29369,7 +29370,7 @@
           <a:p>
             <a:fld id="{D5CC1E73-71FD-4C17-BF7E-AE74FB2EE1A1}" type="datetimeFigureOut">
               <a:rPr lang="en-US" smtClean="0"/>
-              <a:t>4/2/2020</a:t>
+              <a:t>4/3/2020</a:t>
             </a:fld>
             <a:endParaRPr lang="en-US"/>
           </a:p>
@@ -30124,6 +30125,92 @@
 <file path=ppt/slides/slide1.xml><?xml version="1.0" encoding="utf-8"?>
 <p:sld xmlns:a="http://schemas.openxmlformats.org/drawingml/2006/main" xmlns:r="http://schemas.openxmlformats.org/officeDocument/2006/relationships" xmlns:p="http://schemas.openxmlformats.org/presentationml/2006/main">
   <p:cSld>
+    <p:spTree>
+      <p:nvGrpSpPr>
+        <p:cNvPr id="1" name=""/>
+        <p:cNvGrpSpPr/>
+        <p:nvPr/>
+      </p:nvGrpSpPr>
+      <p:grpSpPr>
+        <a:xfrm>
+          <a:off x="0" y="0"/>
+          <a:ext cx="0" cy="0"/>
+          <a:chOff x="0" y="0"/>
+          <a:chExt cx="0" cy="0"/>
+        </a:xfrm>
+      </p:grpSpPr>
+      <p:sp>
+        <p:nvSpPr>
+          <p:cNvPr id="2" name="Title 1">
+            <a:extLst>
+              <a:ext uri="{FF2B5EF4-FFF2-40B4-BE49-F238E27FC236}">
+                <a16:creationId xmlns:a16="http://schemas.microsoft.com/office/drawing/2014/main" id="{BDDDE044-0BDD-49CA-B167-F81231D305CF}"/>
+              </a:ext>
+            </a:extLst>
+          </p:cNvPr>
+          <p:cNvSpPr>
+            <a:spLocks noGrp="1"/>
+          </p:cNvSpPr>
+          <p:nvPr>
+            <p:ph type="title"/>
+          </p:nvPr>
+        </p:nvSpPr>
+        <p:spPr/>
+        <p:txBody>
+          <a:bodyPr/>
+          <a:lstStyle/>
+          <a:p>
+            <a:endParaRPr lang="en-US"/>
+          </a:p>
+        </p:txBody>
+      </p:sp>
+      <p:sp>
+        <p:nvSpPr>
+          <p:cNvPr id="3" name="Content Placeholder 2">
+            <a:extLst>
+              <a:ext uri="{FF2B5EF4-FFF2-40B4-BE49-F238E27FC236}">
+                <a16:creationId xmlns:a16="http://schemas.microsoft.com/office/drawing/2014/main" id="{E487D08D-A1D1-43F0-AAB7-ADC71692E701}"/>
+              </a:ext>
+            </a:extLst>
+          </p:cNvPr>
+          <p:cNvSpPr>
+            <a:spLocks noGrp="1"/>
+          </p:cNvSpPr>
+          <p:nvPr>
+            <p:ph idx="1"/>
+          </p:nvPr>
+        </p:nvSpPr>
+        <p:spPr/>
+        <p:txBody>
+          <a:bodyPr/>
+          <a:lstStyle/>
+          <a:p>
+            <a:pPr marL="0" indent="0">
+              <a:buNone/>
+            </a:pPr>
+            <a:r>
+              <a:rPr lang="en-US" dirty="0"/>
+              <a:t>The briefing you will prepare should mirror the sections in the SAGE Article (E02, E03).  There is no slide limit on this presentation, please use your best judgment in creating slides that showcase your work for CYSE 493 instructors and Sage Judges.</a:t>
+            </a:r>
+          </a:p>
+        </p:txBody>
+      </p:sp>
+    </p:spTree>
+    <p:extLst>
+      <p:ext uri="{BB962C8B-B14F-4D97-AF65-F5344CB8AC3E}">
+        <p14:creationId xmlns:p14="http://schemas.microsoft.com/office/powerpoint/2010/main" val="4214909375"/>
+      </p:ext>
+    </p:extLst>
+  </p:cSld>
+  <p:clrMapOvr>
+    <a:masterClrMapping/>
+  </p:clrMapOvr>
+</p:sld>
+</file>
+
+<file path=ppt/slides/slide10.xml><?xml version="1.0" encoding="utf-8"?>
+<p:sld xmlns:a="http://schemas.openxmlformats.org/drawingml/2006/main" xmlns:r="http://schemas.openxmlformats.org/officeDocument/2006/relationships" xmlns:p="http://schemas.openxmlformats.org/presentationml/2006/main">
+  <p:cSld>
     <p:bg>
       <p:bgPr>
         <a:blipFill rotWithShape="1">
@@ -30161,58 +30248,12 @@
           <a:chExt cx="0" cy="0"/>
         </a:xfrm>
       </p:grpSpPr>
-      <p:pic>
-        <p:nvPicPr>
-          <p:cNvPr id="1028" name="Picture 2">
-            <a:extLst>
-              <a:ext uri="{FF2B5EF4-FFF2-40B4-BE49-F238E27FC236}">
-                <a16:creationId xmlns:a16="http://schemas.microsoft.com/office/drawing/2014/main" id="{916D26B6-D283-4DBF-A80C-04F39D0FC65F}"/>
-              </a:ext>
-            </a:extLst>
-          </p:cNvPr>
-          <p:cNvPicPr>
-            <a:picLocks noChangeAspect="1" noChangeArrowheads="1"/>
-          </p:cNvPicPr>
-          <p:nvPr/>
-        </p:nvPicPr>
-        <p:blipFill rotWithShape="1">
-          <a:blip r:embed="rId3">
-            <a:alphaModFix amt="15000"/>
-            <a:extLst>
-              <a:ext uri="{28A0092B-C50C-407E-A947-70E740481C1C}">
-                <a14:useLocalDpi xmlns:a14="http://schemas.microsoft.com/office/drawing/2010/main" val="0"/>
-              </a:ext>
-            </a:extLst>
-          </a:blip>
-          <a:srcRect t="22408" b="21344"/>
-          <a:stretch/>
-        </p:blipFill>
-        <p:spPr bwMode="auto">
-          <a:xfrm>
-            <a:off x="0" y="-1"/>
-            <a:ext cx="12191980" cy="6858001"/>
-          </a:xfrm>
-          <a:prstGeom prst="rect">
-            <a:avLst/>
-          </a:prstGeom>
-          <a:noFill/>
-          <a:extLst>
-            <a:ext uri="{909E8E84-426E-40DD-AFC4-6F175D3DCCD1}">
-              <a14:hiddenFill xmlns:a14="http://schemas.microsoft.com/office/drawing/2010/main">
-                <a:solidFill>
-                  <a:srgbClr val="FFFFFF"/>
-                </a:solidFill>
-              </a14:hiddenFill>
-            </a:ext>
-          </a:extLst>
-        </p:spPr>
-      </p:pic>
       <p:sp>
         <p:nvSpPr>
           <p:cNvPr id="2" name="Title 1">
             <a:extLst>
               <a:ext uri="{FF2B5EF4-FFF2-40B4-BE49-F238E27FC236}">
-                <a16:creationId xmlns:a16="http://schemas.microsoft.com/office/drawing/2014/main" id="{1E00D9A3-A428-451C-921D-A8BEDDFD6A12}"/>
+                <a16:creationId xmlns:a16="http://schemas.microsoft.com/office/drawing/2014/main" id="{6BB14554-ADDA-4895-A316-B5D567308863}"/>
               </a:ext>
             </a:extLst>
           </p:cNvPr>
@@ -30220,135 +30261,64 @@
             <a:spLocks noGrp="1"/>
           </p:cNvSpPr>
           <p:nvPr>
-            <p:ph type="ctrTitle"/>
+            <p:ph type="title"/>
           </p:nvPr>
         </p:nvSpPr>
         <p:spPr>
           <a:xfrm>
-            <a:off x="1751012" y="609601"/>
-            <a:ext cx="8676222" cy="3200400"/>
+            <a:off x="1141413" y="609600"/>
+            <a:ext cx="9905998" cy="1468582"/>
           </a:xfrm>
         </p:spPr>
         <p:txBody>
-          <a:bodyPr vert="horz" lIns="91440" tIns="45720" rIns="91440" bIns="45720" rtlCol="0">
+          <a:bodyPr>
             <a:normAutofit/>
           </a:bodyPr>
           <a:lstStyle/>
           <a:p>
             <a:r>
-              <a:rPr lang="en-US" dirty="0">
-                <a:ln w="22225">
-                  <a:solidFill>
-                    <a:srgbClr val="FFFFFF"/>
-                  </a:solidFill>
-                </a:ln>
-              </a:rPr>
-              <a:t>Eo4 Sage Presentation:</a:t>
+              <a:rPr lang="en-US"/>
+              <a:t>Challenges</a:t>
             </a:r>
-            <a:br>
-              <a:rPr lang="en-US" dirty="0">
-                <a:ln w="22225">
-                  <a:solidFill>
-                    <a:srgbClr val="FFFFFF"/>
-                  </a:solidFill>
-                </a:ln>
-                <a:effectLst/>
-              </a:rPr>
-            </a:br>
-            <a:r>
-              <a:rPr lang="en-US" dirty="0">
-                <a:ln w="22225">
-                  <a:solidFill>
-                    <a:srgbClr val="FFFFFF"/>
-                  </a:solidFill>
-                </a:ln>
-              </a:rPr>
-              <a:t>LM Windows Packer and Loader</a:t>
-            </a:r>
-          </a:p>
-        </p:txBody>
-      </p:sp>
-      <p:sp>
-        <p:nvSpPr>
-          <p:cNvPr id="3" name="Subtitle 2">
-            <a:extLst>
-              <a:ext uri="{FF2B5EF4-FFF2-40B4-BE49-F238E27FC236}">
-                <a16:creationId xmlns:a16="http://schemas.microsoft.com/office/drawing/2014/main" id="{4F8EA592-B54F-4873-806A-23134A89D0F7}"/>
-              </a:ext>
-            </a:extLst>
-          </p:cNvPr>
-          <p:cNvSpPr>
-            <a:spLocks noGrp="1"/>
-          </p:cNvSpPr>
-          <p:nvPr>
-            <p:ph type="subTitle" idx="1"/>
-          </p:nvPr>
-        </p:nvSpPr>
-        <p:spPr>
-          <a:xfrm>
-            <a:off x="1751012" y="3886200"/>
-            <a:ext cx="8676222" cy="1905000"/>
-          </a:xfrm>
-        </p:spPr>
-        <p:txBody>
-          <a:bodyPr vert="horz" lIns="91440" tIns="45720" rIns="91440" bIns="45720" rtlCol="0">
-            <a:normAutofit/>
-          </a:bodyPr>
-          <a:lstStyle/>
-          <a:p>
-            <a:r>
-              <a:rPr lang="en-US" dirty="0"/>
-              <a:t>Mitchell Palmer</a:t>
-            </a:r>
-            <a:br>
-              <a:rPr lang="en-US" dirty="0"/>
-            </a:br>
-            <a:r>
-              <a:rPr lang="en-US" dirty="0"/>
-              <a:t>Andrew Chapin</a:t>
-            </a:r>
-            <a:br>
-              <a:rPr lang="en-US" dirty="0"/>
-            </a:br>
-            <a:r>
-              <a:rPr lang="en-US" dirty="0"/>
-              <a:t>Carl Bai</a:t>
-            </a:r>
-            <a:br>
-              <a:rPr lang="en-US" dirty="0"/>
-            </a:br>
-            <a:r>
-              <a:rPr lang="en-US" dirty="0"/>
-              <a:t>Hunter </a:t>
-            </a:r>
-            <a:r>
-              <a:rPr lang="en-US" dirty="0" err="1"/>
-              <a:t>Rowlette</a:t>
-            </a:r>
-            <a:br>
-              <a:rPr lang="en-US" dirty="0"/>
-            </a:br>
-            <a:r>
-              <a:rPr lang="en-US" dirty="0"/>
-              <a:t>Andre Herrera</a:t>
-            </a:r>
-            <a:endParaRPr lang="en-US" dirty="0">
-              <a:effectLst/>
-            </a:endParaRPr>
-          </a:p>
-          <a:p>
-            <a:pPr indent="-228600">
-              <a:buFont typeface="Arial" panose="020B0604020202020204" pitchFamily="34" charset="0"/>
-              <a:buChar char="•"/>
-            </a:pPr>
             <a:endParaRPr lang="en-US" dirty="0"/>
           </a:p>
         </p:txBody>
       </p:sp>
+      <p:graphicFrame>
+        <p:nvGraphicFramePr>
+          <p:cNvPr id="7" name="Content Placeholder 2">
+            <a:extLst>
+              <a:ext uri="{FF2B5EF4-FFF2-40B4-BE49-F238E27FC236}">
+                <a16:creationId xmlns:a16="http://schemas.microsoft.com/office/drawing/2014/main" id="{7FE14F1E-A4C3-49D5-B171-9A8B5500BA5D}"/>
+              </a:ext>
+            </a:extLst>
+          </p:cNvPr>
+          <p:cNvGraphicFramePr>
+            <a:graphicFrameLocks noGrp="1"/>
+          </p:cNvGraphicFramePr>
+          <p:nvPr>
+            <p:ph idx="1"/>
+            <p:extLst>
+              <p:ext uri="{D42A27DB-BD31-4B8C-83A1-F6EECF244321}">
+                <p14:modId xmlns:p14="http://schemas.microsoft.com/office/powerpoint/2010/main" val="2783863865"/>
+              </p:ext>
+            </p:extLst>
+          </p:nvPr>
+        </p:nvGraphicFramePr>
+        <p:xfrm>
+          <a:off x="1141413" y="2286000"/>
+          <a:ext cx="9906000" cy="3387436"/>
+        </p:xfrm>
+        <a:graphic>
+          <a:graphicData uri="http://schemas.openxmlformats.org/drawingml/2006/diagram">
+            <dgm:relIds xmlns:dgm="http://schemas.openxmlformats.org/drawingml/2006/diagram" xmlns:r="http://schemas.openxmlformats.org/officeDocument/2006/relationships" r:dm="rId3" r:lo="rId4" r:qs="rId5" r:cs="rId6"/>
+          </a:graphicData>
+        </a:graphic>
+      </p:graphicFrame>
     </p:spTree>
     <p:extLst>
       <p:ext uri="{BB962C8B-B14F-4D97-AF65-F5344CB8AC3E}">
-        <p14:creationId xmlns:p14="http://schemas.microsoft.com/office/powerpoint/2010/main" val="252392915"/>
+        <p14:creationId xmlns:p14="http://schemas.microsoft.com/office/powerpoint/2010/main" val="967871934"/>
       </p:ext>
     </p:extLst>
   </p:cSld>
@@ -30358,7 +30328,7 @@
 </p:sld>
 </file>
 
-<file path=ppt/slides/slide10.xml><?xml version="1.0" encoding="utf-8"?>
+<file path=ppt/slides/slide11.xml><?xml version="1.0" encoding="utf-8"?>
 <p:sld xmlns:a="http://schemas.openxmlformats.org/drawingml/2006/main" xmlns:r="http://schemas.openxmlformats.org/officeDocument/2006/relationships" xmlns:p="http://schemas.openxmlformats.org/presentationml/2006/main">
   <p:cSld>
     <p:bg>
@@ -30574,7 +30544,7 @@
 </p:sld>
 </file>
 
-<file path=ppt/slides/slide11.xml><?xml version="1.0" encoding="utf-8"?>
+<file path=ppt/slides/slide12.xml><?xml version="1.0" encoding="utf-8"?>
 <p:sld xmlns:a="http://schemas.openxmlformats.org/drawingml/2006/main" xmlns:r="http://schemas.openxmlformats.org/officeDocument/2006/relationships" xmlns:p="http://schemas.openxmlformats.org/presentationml/2006/main">
   <p:cSld>
     <p:bg>
@@ -30812,7 +30782,7 @@
 </p:sld>
 </file>
 
-<file path=ppt/slides/slide12.xml><?xml version="1.0" encoding="utf-8"?>
+<file path=ppt/slides/slide13.xml><?xml version="1.0" encoding="utf-8"?>
 <p:sld xmlns:a="http://schemas.openxmlformats.org/drawingml/2006/main" xmlns:r="http://schemas.openxmlformats.org/officeDocument/2006/relationships" xmlns:p="http://schemas.openxmlformats.org/presentationml/2006/main">
   <p:cSld>
     <p:bg>
@@ -31067,7 +31037,7 @@
 </p:sld>
 </file>
 
-<file path=ppt/slides/slide13.xml><?xml version="1.0" encoding="utf-8"?>
+<file path=ppt/slides/slide14.xml><?xml version="1.0" encoding="utf-8"?>
 <p:sld xmlns:a="http://schemas.openxmlformats.org/drawingml/2006/main" xmlns:r="http://schemas.openxmlformats.org/officeDocument/2006/relationships" xmlns:p="http://schemas.openxmlformats.org/presentationml/2006/main">
   <p:cSld>
     <p:bg>
@@ -31186,7 +31156,7 @@
 </p:sld>
 </file>
 
-<file path=ppt/slides/slide14.xml><?xml version="1.0" encoding="utf-8"?>
+<file path=ppt/slides/slide15.xml><?xml version="1.0" encoding="utf-8"?>
 <p:sld xmlns:a="http://schemas.openxmlformats.org/drawingml/2006/main" xmlns:r="http://schemas.openxmlformats.org/officeDocument/2006/relationships" xmlns:p="http://schemas.openxmlformats.org/presentationml/2006/main">
   <p:cSld>
     <p:bg>
@@ -31305,7 +31275,7 @@
 </p:sld>
 </file>
 
-<file path=ppt/slides/slide15.xml><?xml version="1.0" encoding="utf-8"?>
+<file path=ppt/slides/slide16.xml><?xml version="1.0" encoding="utf-8"?>
 <p:sld xmlns:a="http://schemas.openxmlformats.org/drawingml/2006/main" xmlns:r="http://schemas.openxmlformats.org/officeDocument/2006/relationships" xmlns:p="http://schemas.openxmlformats.org/presentationml/2006/main">
   <p:cSld>
     <p:bg>
@@ -31502,6 +31472,243 @@
 </file>
 
 <file path=ppt/slides/slide2.xml><?xml version="1.0" encoding="utf-8"?>
+<p:sld xmlns:a="http://schemas.openxmlformats.org/drawingml/2006/main" xmlns:r="http://schemas.openxmlformats.org/officeDocument/2006/relationships" xmlns:p="http://schemas.openxmlformats.org/presentationml/2006/main">
+  <p:cSld>
+    <p:bg>
+      <p:bgPr>
+        <a:blipFill rotWithShape="1">
+          <a:blip r:embed="rId2">
+            <a:duotone>
+              <a:schemeClr val="bg2">
+                <a:shade val="28000"/>
+                <a:satMod val="94000"/>
+                <a:lumMod val="20000"/>
+              </a:schemeClr>
+              <a:schemeClr val="bg2">
+                <a:tint val="94000"/>
+                <a:shade val="84000"/>
+                <a:satMod val="148000"/>
+                <a:lumMod val="114000"/>
+              </a:schemeClr>
+            </a:duotone>
+          </a:blip>
+          <a:stretch/>
+        </a:blipFill>
+        <a:effectLst/>
+      </p:bgPr>
+    </p:bg>
+    <p:spTree>
+      <p:nvGrpSpPr>
+        <p:cNvPr id="1" name=""/>
+        <p:cNvGrpSpPr/>
+        <p:nvPr/>
+      </p:nvGrpSpPr>
+      <p:grpSpPr>
+        <a:xfrm>
+          <a:off x="0" y="0"/>
+          <a:ext cx="0" cy="0"/>
+          <a:chOff x="0" y="0"/>
+          <a:chExt cx="0" cy="0"/>
+        </a:xfrm>
+      </p:grpSpPr>
+      <p:pic>
+        <p:nvPicPr>
+          <p:cNvPr id="1028" name="Picture 2">
+            <a:extLst>
+              <a:ext uri="{FF2B5EF4-FFF2-40B4-BE49-F238E27FC236}">
+                <a16:creationId xmlns:a16="http://schemas.microsoft.com/office/drawing/2014/main" id="{916D26B6-D283-4DBF-A80C-04F39D0FC65F}"/>
+              </a:ext>
+            </a:extLst>
+          </p:cNvPr>
+          <p:cNvPicPr>
+            <a:picLocks noChangeAspect="1" noChangeArrowheads="1"/>
+          </p:cNvPicPr>
+          <p:nvPr/>
+        </p:nvPicPr>
+        <p:blipFill rotWithShape="1">
+          <a:blip r:embed="rId3">
+            <a:alphaModFix amt="15000"/>
+            <a:extLst>
+              <a:ext uri="{28A0092B-C50C-407E-A947-70E740481C1C}">
+                <a14:useLocalDpi xmlns:a14="http://schemas.microsoft.com/office/drawing/2010/main" val="0"/>
+              </a:ext>
+            </a:extLst>
+          </a:blip>
+          <a:srcRect t="22408" b="21344"/>
+          <a:stretch/>
+        </p:blipFill>
+        <p:spPr bwMode="auto">
+          <a:xfrm>
+            <a:off x="0" y="-1"/>
+            <a:ext cx="12191980" cy="6858001"/>
+          </a:xfrm>
+          <a:prstGeom prst="rect">
+            <a:avLst/>
+          </a:prstGeom>
+          <a:noFill/>
+          <a:extLst>
+            <a:ext uri="{909E8E84-426E-40DD-AFC4-6F175D3DCCD1}">
+              <a14:hiddenFill xmlns:a14="http://schemas.microsoft.com/office/drawing/2010/main">
+                <a:solidFill>
+                  <a:srgbClr val="FFFFFF"/>
+                </a:solidFill>
+              </a14:hiddenFill>
+            </a:ext>
+          </a:extLst>
+        </p:spPr>
+      </p:pic>
+      <p:sp>
+        <p:nvSpPr>
+          <p:cNvPr id="2" name="Title 1">
+            <a:extLst>
+              <a:ext uri="{FF2B5EF4-FFF2-40B4-BE49-F238E27FC236}">
+                <a16:creationId xmlns:a16="http://schemas.microsoft.com/office/drawing/2014/main" id="{1E00D9A3-A428-451C-921D-A8BEDDFD6A12}"/>
+              </a:ext>
+            </a:extLst>
+          </p:cNvPr>
+          <p:cNvSpPr>
+            <a:spLocks noGrp="1"/>
+          </p:cNvSpPr>
+          <p:nvPr>
+            <p:ph type="ctrTitle"/>
+          </p:nvPr>
+        </p:nvSpPr>
+        <p:spPr>
+          <a:xfrm>
+            <a:off x="1751012" y="609601"/>
+            <a:ext cx="8676222" cy="3200400"/>
+          </a:xfrm>
+        </p:spPr>
+        <p:txBody>
+          <a:bodyPr vert="horz" lIns="91440" tIns="45720" rIns="91440" bIns="45720" rtlCol="0">
+            <a:normAutofit/>
+          </a:bodyPr>
+          <a:lstStyle/>
+          <a:p>
+            <a:r>
+              <a:rPr lang="en-US" dirty="0">
+                <a:ln w="22225">
+                  <a:solidFill>
+                    <a:srgbClr val="FFFFFF"/>
+                  </a:solidFill>
+                </a:ln>
+              </a:rPr>
+              <a:t>Eo4 Sage Presentation:</a:t>
+            </a:r>
+            <a:br>
+              <a:rPr lang="en-US" dirty="0">
+                <a:ln w="22225">
+                  <a:solidFill>
+                    <a:srgbClr val="FFFFFF"/>
+                  </a:solidFill>
+                </a:ln>
+                <a:effectLst/>
+              </a:rPr>
+            </a:br>
+            <a:r>
+              <a:rPr lang="en-US" dirty="0">
+                <a:ln w="22225">
+                  <a:solidFill>
+                    <a:srgbClr val="FFFFFF"/>
+                  </a:solidFill>
+                </a:ln>
+              </a:rPr>
+              <a:t>LM Windows Packer and Loader</a:t>
+            </a:r>
+          </a:p>
+        </p:txBody>
+      </p:sp>
+      <p:sp>
+        <p:nvSpPr>
+          <p:cNvPr id="3" name="Subtitle 2">
+            <a:extLst>
+              <a:ext uri="{FF2B5EF4-FFF2-40B4-BE49-F238E27FC236}">
+                <a16:creationId xmlns:a16="http://schemas.microsoft.com/office/drawing/2014/main" id="{4F8EA592-B54F-4873-806A-23134A89D0F7}"/>
+              </a:ext>
+            </a:extLst>
+          </p:cNvPr>
+          <p:cNvSpPr>
+            <a:spLocks noGrp="1"/>
+          </p:cNvSpPr>
+          <p:nvPr>
+            <p:ph type="subTitle" idx="1"/>
+          </p:nvPr>
+        </p:nvSpPr>
+        <p:spPr>
+          <a:xfrm>
+            <a:off x="1751012" y="3886200"/>
+            <a:ext cx="8676222" cy="1905000"/>
+          </a:xfrm>
+        </p:spPr>
+        <p:txBody>
+          <a:bodyPr vert="horz" lIns="91440" tIns="45720" rIns="91440" bIns="45720" rtlCol="0">
+            <a:normAutofit/>
+          </a:bodyPr>
+          <a:lstStyle/>
+          <a:p>
+            <a:r>
+              <a:rPr lang="en-US" dirty="0"/>
+              <a:t>Mitchell Palmer</a:t>
+            </a:r>
+            <a:br>
+              <a:rPr lang="en-US" dirty="0"/>
+            </a:br>
+            <a:r>
+              <a:rPr lang="en-US" dirty="0"/>
+              <a:t>Andrew Chapin</a:t>
+            </a:r>
+            <a:br>
+              <a:rPr lang="en-US" dirty="0"/>
+            </a:br>
+            <a:r>
+              <a:rPr lang="en-US" dirty="0"/>
+              <a:t>Carl Bai</a:t>
+            </a:r>
+            <a:br>
+              <a:rPr lang="en-US" dirty="0"/>
+            </a:br>
+            <a:r>
+              <a:rPr lang="en-US" dirty="0"/>
+              <a:t>Hunter </a:t>
+            </a:r>
+            <a:r>
+              <a:rPr lang="en-US" dirty="0" err="1"/>
+              <a:t>Rowlette</a:t>
+            </a:r>
+            <a:br>
+              <a:rPr lang="en-US" dirty="0"/>
+            </a:br>
+            <a:r>
+              <a:rPr lang="en-US" dirty="0"/>
+              <a:t>Andre Herrera</a:t>
+            </a:r>
+            <a:endParaRPr lang="en-US" dirty="0">
+              <a:effectLst/>
+            </a:endParaRPr>
+          </a:p>
+          <a:p>
+            <a:pPr indent="-228600">
+              <a:buFont typeface="Arial" panose="020B0604020202020204" pitchFamily="34" charset="0"/>
+              <a:buChar char="•"/>
+            </a:pPr>
+            <a:endParaRPr lang="en-US" dirty="0"/>
+          </a:p>
+        </p:txBody>
+      </p:sp>
+    </p:spTree>
+    <p:extLst>
+      <p:ext uri="{BB962C8B-B14F-4D97-AF65-F5344CB8AC3E}">
+        <p14:creationId xmlns:p14="http://schemas.microsoft.com/office/powerpoint/2010/main" val="252392915"/>
+      </p:ext>
+    </p:extLst>
+  </p:cSld>
+  <p:clrMapOvr>
+    <a:masterClrMapping/>
+  </p:clrMapOvr>
+</p:sld>
+</file>
+
+<file path=ppt/slides/slide3.xml><?xml version="1.0" encoding="utf-8"?>
 <p:sld xmlns:a="http://schemas.openxmlformats.org/drawingml/2006/main" xmlns:r="http://schemas.openxmlformats.org/officeDocument/2006/relationships" xmlns:p="http://schemas.openxmlformats.org/presentationml/2006/main">
   <p:cSld>
     <p:bg>
@@ -31887,7 +32094,7 @@
 </p:sld>
 </file>
 
-<file path=ppt/slides/slide3.xml><?xml version="1.0" encoding="utf-8"?>
+<file path=ppt/slides/slide4.xml><?xml version="1.0" encoding="utf-8"?>
 <p:sld xmlns:a="http://schemas.openxmlformats.org/drawingml/2006/main" xmlns:r="http://schemas.openxmlformats.org/officeDocument/2006/relationships" xmlns:p="http://schemas.openxmlformats.org/presentationml/2006/main">
   <p:cSld>
     <p:bg>
@@ -32447,7 +32654,7 @@
 </p:sld>
 </file>
 
-<file path=ppt/slides/slide4.xml><?xml version="1.0" encoding="utf-8"?>
+<file path=ppt/slides/slide5.xml><?xml version="1.0" encoding="utf-8"?>
 <p:sld xmlns:a="http://schemas.openxmlformats.org/drawingml/2006/main" xmlns:r="http://schemas.openxmlformats.org/officeDocument/2006/relationships" xmlns:p="http://schemas.openxmlformats.org/presentationml/2006/main">
   <p:cSld>
     <p:bg>
@@ -32995,7 +33202,7 @@
 </p:sld>
 </file>
 
-<file path=ppt/slides/slide5.xml><?xml version="1.0" encoding="utf-8"?>
+<file path=ppt/slides/slide6.xml><?xml version="1.0" encoding="utf-8"?>
 <p:sld xmlns:a="http://schemas.openxmlformats.org/drawingml/2006/main" xmlns:r="http://schemas.openxmlformats.org/officeDocument/2006/relationships" xmlns:p="http://schemas.openxmlformats.org/presentationml/2006/main">
   <p:cSld>
     <p:bg>
@@ -33121,7 +33328,7 @@
 </p:sld>
 </file>
 
-<file path=ppt/slides/slide6.xml><?xml version="1.0" encoding="utf-8"?>
+<file path=ppt/slides/slide7.xml><?xml version="1.0" encoding="utf-8"?>
 <p:sld xmlns:a="http://schemas.openxmlformats.org/drawingml/2006/main" xmlns:r="http://schemas.openxmlformats.org/officeDocument/2006/relationships" xmlns:p="http://schemas.openxmlformats.org/presentationml/2006/main">
   <p:cSld>
     <p:bg>
@@ -33437,7 +33644,7 @@
 </p:sld>
 </file>
 
-<file path=ppt/slides/slide7.xml><?xml version="1.0" encoding="utf-8"?>
+<file path=ppt/slides/slide8.xml><?xml version="1.0" encoding="utf-8"?>
 <p:sld xmlns:a="http://schemas.openxmlformats.org/drawingml/2006/main" xmlns:r="http://schemas.openxmlformats.org/officeDocument/2006/relationships" xmlns:p="http://schemas.openxmlformats.org/presentationml/2006/main">
   <p:cSld>
     <p:bg>
@@ -33556,7 +33763,7 @@
 </p:sld>
 </file>
 
-<file path=ppt/slides/slide8.xml><?xml version="1.0" encoding="utf-8"?>
+<file path=ppt/slides/slide9.xml><?xml version="1.0" encoding="utf-8"?>
 <p:sld xmlns:a="http://schemas.openxmlformats.org/drawingml/2006/main" xmlns:r="http://schemas.openxmlformats.org/officeDocument/2006/relationships" xmlns:p="http://schemas.openxmlformats.org/presentationml/2006/main">
   <p:cSld>
     <p:bg>
@@ -33666,126 +33873,6 @@
     <p:extLst>
       <p:ext uri="{BB962C8B-B14F-4D97-AF65-F5344CB8AC3E}">
         <p14:creationId xmlns:p14="http://schemas.microsoft.com/office/powerpoint/2010/main" val="4090414971"/>
-      </p:ext>
-    </p:extLst>
-  </p:cSld>
-  <p:clrMapOvr>
-    <a:masterClrMapping/>
-  </p:clrMapOvr>
-</p:sld>
-</file>
-
-<file path=ppt/slides/slide9.xml><?xml version="1.0" encoding="utf-8"?>
-<p:sld xmlns:a="http://schemas.openxmlformats.org/drawingml/2006/main" xmlns:r="http://schemas.openxmlformats.org/officeDocument/2006/relationships" xmlns:p="http://schemas.openxmlformats.org/presentationml/2006/main">
-  <p:cSld>
-    <p:bg>
-      <p:bgPr>
-        <a:blipFill rotWithShape="1">
-          <a:blip r:embed="rId2">
-            <a:duotone>
-              <a:schemeClr val="bg2">
-                <a:shade val="28000"/>
-                <a:satMod val="94000"/>
-                <a:lumMod val="20000"/>
-              </a:schemeClr>
-              <a:schemeClr val="bg2">
-                <a:tint val="94000"/>
-                <a:shade val="84000"/>
-                <a:satMod val="148000"/>
-                <a:lumMod val="114000"/>
-              </a:schemeClr>
-            </a:duotone>
-          </a:blip>
-          <a:stretch/>
-        </a:blipFill>
-        <a:effectLst/>
-      </p:bgPr>
-    </p:bg>
-    <p:spTree>
-      <p:nvGrpSpPr>
-        <p:cNvPr id="1" name=""/>
-        <p:cNvGrpSpPr/>
-        <p:nvPr/>
-      </p:nvGrpSpPr>
-      <p:grpSpPr>
-        <a:xfrm>
-          <a:off x="0" y="0"/>
-          <a:ext cx="0" cy="0"/>
-          <a:chOff x="0" y="0"/>
-          <a:chExt cx="0" cy="0"/>
-        </a:xfrm>
-      </p:grpSpPr>
-      <p:sp>
-        <p:nvSpPr>
-          <p:cNvPr id="2" name="Title 1">
-            <a:extLst>
-              <a:ext uri="{FF2B5EF4-FFF2-40B4-BE49-F238E27FC236}">
-                <a16:creationId xmlns:a16="http://schemas.microsoft.com/office/drawing/2014/main" id="{6BB14554-ADDA-4895-A316-B5D567308863}"/>
-              </a:ext>
-            </a:extLst>
-          </p:cNvPr>
-          <p:cNvSpPr>
-            <a:spLocks noGrp="1"/>
-          </p:cNvSpPr>
-          <p:nvPr>
-            <p:ph type="title"/>
-          </p:nvPr>
-        </p:nvSpPr>
-        <p:spPr>
-          <a:xfrm>
-            <a:off x="1141413" y="609600"/>
-            <a:ext cx="9905998" cy="1468582"/>
-          </a:xfrm>
-        </p:spPr>
-        <p:txBody>
-          <a:bodyPr>
-            <a:normAutofit/>
-          </a:bodyPr>
-          <a:lstStyle/>
-          <a:p>
-            <a:r>
-              <a:rPr lang="en-US"/>
-              <a:t>Challenges</a:t>
-            </a:r>
-            <a:endParaRPr lang="en-US" dirty="0"/>
-          </a:p>
-        </p:txBody>
-      </p:sp>
-      <p:graphicFrame>
-        <p:nvGraphicFramePr>
-          <p:cNvPr id="7" name="Content Placeholder 2">
-            <a:extLst>
-              <a:ext uri="{FF2B5EF4-FFF2-40B4-BE49-F238E27FC236}">
-                <a16:creationId xmlns:a16="http://schemas.microsoft.com/office/drawing/2014/main" id="{7FE14F1E-A4C3-49D5-B171-9A8B5500BA5D}"/>
-              </a:ext>
-            </a:extLst>
-          </p:cNvPr>
-          <p:cNvGraphicFramePr>
-            <a:graphicFrameLocks noGrp="1"/>
-          </p:cNvGraphicFramePr>
-          <p:nvPr>
-            <p:ph idx="1"/>
-            <p:extLst>
-              <p:ext uri="{D42A27DB-BD31-4B8C-83A1-F6EECF244321}">
-                <p14:modId xmlns:p14="http://schemas.microsoft.com/office/powerpoint/2010/main" val="2783863865"/>
-              </p:ext>
-            </p:extLst>
-          </p:nvPr>
-        </p:nvGraphicFramePr>
-        <p:xfrm>
-          <a:off x="1141413" y="2286000"/>
-          <a:ext cx="9906000" cy="3387436"/>
-        </p:xfrm>
-        <a:graphic>
-          <a:graphicData uri="http://schemas.openxmlformats.org/drawingml/2006/diagram">
-            <dgm:relIds xmlns:dgm="http://schemas.openxmlformats.org/drawingml/2006/diagram" xmlns:r="http://schemas.openxmlformats.org/officeDocument/2006/relationships" r:dm="rId3" r:lo="rId4" r:qs="rId5" r:cs="rId6"/>
-          </a:graphicData>
-        </a:graphic>
-      </p:graphicFrame>
-    </p:spTree>
-    <p:extLst>
-      <p:ext uri="{BB962C8B-B14F-4D97-AF65-F5344CB8AC3E}">
-        <p14:creationId xmlns:p14="http://schemas.microsoft.com/office/powerpoint/2010/main" val="967871934"/>
       </p:ext>
     </p:extLst>
   </p:cSld>

</xml_diff>